<commit_message>
DCF en Alarm delen samengevoegd
</commit_message>
<xml_diff>
--- a/Presentatie/Alarm.pptx
+++ b/Presentatie/Alarm.pptx
@@ -11,7 +11,7 @@
     <p:handoutMasterId r:id="rId8"/>
   </p:handoutMasterIdLst>
   <p:sldIdLst>
-    <p:sldId id="377" r:id="rId2"/>
+    <p:sldId id="382" r:id="rId2"/>
     <p:sldId id="381" r:id="rId3"/>
     <p:sldId id="378" r:id="rId4"/>
     <p:sldId id="379" r:id="rId5"/>
@@ -294,7 +294,7 @@
               <a:pPr>
                 <a:defRPr/>
               </a:pPr>
-              <a:t>1/15/2015</a:t>
+              <a:t>1/18/2015</a:t>
             </a:fld>
             <a:endParaRPr lang="en-US" altLang="nl-NL"/>
           </a:p>
@@ -4812,348 +4812,37 @@
       </p:grpSpPr>
       <p:sp>
         <p:nvSpPr>
-          <p:cNvPr id="3074" name="Rectangle 5"/>
-          <p:cNvSpPr>
-            <a:spLocks noChangeArrowheads="1"/>
-          </p:cNvSpPr>
-          <p:nvPr/>
-        </p:nvSpPr>
-        <p:spPr bwMode="auto">
-          <a:xfrm>
-            <a:off x="471488" y="2055813"/>
-            <a:ext cx="7307262" cy="1897062"/>
-          </a:xfrm>
-          <a:prstGeom prst="rect">
-            <a:avLst/>
-          </a:prstGeom>
-          <a:solidFill>
-            <a:schemeClr val="tx1"/>
-          </a:solidFill>
-          <a:ln>
-            <a:noFill/>
-          </a:ln>
-          <a:extLst>
-            <a:ext uri="{91240B29-F687-4F45-9708-019B960494DF}">
-              <a14:hiddenLine xmlns:a14="http://schemas.microsoft.com/office/drawing/2010/main" w="9525">
-                <a:solidFill>
-                  <a:srgbClr val="000000"/>
-                </a:solidFill>
-                <a:round/>
-                <a:headEnd/>
-                <a:tailEnd/>
-              </a14:hiddenLine>
-            </a:ext>
-          </a:extLst>
-        </p:spPr>
-        <p:txBody>
-          <a:bodyPr/>
-          <a:lstStyle>
-            <a:lvl1pPr algn="l" eaLnBrk="0" hangingPunct="0">
-              <a:lnSpc>
-                <a:spcPts val="2500"/>
-              </a:lnSpc>
-              <a:buClr>
-                <a:srgbClr val="00A6D6"/>
-              </a:buClr>
-              <a:buChar char="•"/>
-              <a:defRPr sz="2000">
-                <a:solidFill>
-                  <a:schemeClr val="tx1"/>
-                </a:solidFill>
-                <a:latin typeface="Tahoma" panose="020B0604030504040204" pitchFamily="34" charset="0"/>
-                <a:ea typeface="ＭＳ Ｐゴシック" panose="020B0600070205080204" pitchFamily="34" charset="-128"/>
-              </a:defRPr>
-            </a:lvl1pPr>
-            <a:lvl2pPr marL="37931725" indent="-37474525" algn="l" eaLnBrk="0" hangingPunct="0">
-              <a:lnSpc>
-                <a:spcPts val="2500"/>
-              </a:lnSpc>
-              <a:buClr>
-                <a:srgbClr val="00A6D6"/>
-              </a:buClr>
-              <a:buFont typeface="Times" panose="02020603050405020304" pitchFamily="18" charset="0"/>
-              <a:buChar char="•"/>
-              <a:defRPr>
-                <a:solidFill>
-                  <a:schemeClr val="tx1"/>
-                </a:solidFill>
-                <a:latin typeface="Tahoma" panose="020B0604030504040204" pitchFamily="34" charset="0"/>
-                <a:ea typeface="ＭＳ Ｐゴシック" panose="020B0600070205080204" pitchFamily="34" charset="-128"/>
-              </a:defRPr>
-            </a:lvl2pPr>
-            <a:lvl3pPr marL="957263" indent="-190500" algn="l" eaLnBrk="0" hangingPunct="0">
-              <a:lnSpc>
-                <a:spcPts val="2500"/>
-              </a:lnSpc>
-              <a:buClr>
-                <a:srgbClr val="00A6D6"/>
-              </a:buClr>
-              <a:buFont typeface="Times" panose="02020603050405020304" pitchFamily="18" charset="0"/>
-              <a:buChar char="•"/>
-              <a:defRPr sz="1600">
-                <a:solidFill>
-                  <a:schemeClr val="tx1"/>
-                </a:solidFill>
-                <a:latin typeface="Tahoma" panose="020B0604030504040204" pitchFamily="34" charset="0"/>
-                <a:ea typeface="ＭＳ Ｐゴシック" panose="020B0600070205080204" pitchFamily="34" charset="-128"/>
-              </a:defRPr>
-            </a:lvl3pPr>
-            <a:lvl4pPr marL="1338263" indent="-190500" algn="l" eaLnBrk="0" hangingPunct="0">
-              <a:lnSpc>
-                <a:spcPts val="2500"/>
-              </a:lnSpc>
-              <a:buClr>
-                <a:schemeClr val="bg2"/>
-              </a:buClr>
-              <a:buFont typeface="Times" panose="02020603050405020304" pitchFamily="18" charset="0"/>
-              <a:buChar char="•"/>
-              <a:defRPr sz="1400">
-                <a:solidFill>
-                  <a:schemeClr val="tx1"/>
-                </a:solidFill>
-                <a:latin typeface="Tahoma" panose="020B0604030504040204" pitchFamily="34" charset="0"/>
-                <a:ea typeface="ＭＳ Ｐゴシック" panose="020B0600070205080204" pitchFamily="34" charset="-128"/>
-              </a:defRPr>
-            </a:lvl4pPr>
-            <a:lvl5pPr marL="1719263" indent="-190500" algn="l" eaLnBrk="0" hangingPunct="0">
-              <a:lnSpc>
-                <a:spcPts val="2500"/>
-              </a:lnSpc>
-              <a:buClr>
-                <a:schemeClr val="bg2"/>
-              </a:buClr>
-              <a:buFont typeface="Times" panose="02020603050405020304" pitchFamily="18" charset="0"/>
-              <a:buChar char="•"/>
-              <a:defRPr sz="1200">
-                <a:solidFill>
-                  <a:schemeClr val="tx1"/>
-                </a:solidFill>
-                <a:latin typeface="Tahoma" panose="020B0604030504040204" pitchFamily="34" charset="0"/>
-                <a:ea typeface="ＭＳ Ｐゴシック" panose="020B0600070205080204" pitchFamily="34" charset="-128"/>
-              </a:defRPr>
-            </a:lvl5pPr>
-            <a:lvl6pPr marL="2176463" indent="-190500" eaLnBrk="0" fontAlgn="base" hangingPunct="0">
-              <a:lnSpc>
-                <a:spcPts val="2500"/>
-              </a:lnSpc>
-              <a:spcBef>
-                <a:spcPct val="0"/>
-              </a:spcBef>
-              <a:spcAft>
-                <a:spcPct val="0"/>
-              </a:spcAft>
-              <a:buClr>
-                <a:schemeClr val="bg2"/>
-              </a:buClr>
-              <a:buFont typeface="Times" panose="02020603050405020304" pitchFamily="18" charset="0"/>
-              <a:buChar char="•"/>
-              <a:defRPr sz="1200">
-                <a:solidFill>
-                  <a:schemeClr val="tx1"/>
-                </a:solidFill>
-                <a:latin typeface="Tahoma" panose="020B0604030504040204" pitchFamily="34" charset="0"/>
-                <a:ea typeface="ＭＳ Ｐゴシック" panose="020B0600070205080204" pitchFamily="34" charset="-128"/>
-              </a:defRPr>
-            </a:lvl6pPr>
-            <a:lvl7pPr marL="2633663" indent="-190500" eaLnBrk="0" fontAlgn="base" hangingPunct="0">
-              <a:lnSpc>
-                <a:spcPts val="2500"/>
-              </a:lnSpc>
-              <a:spcBef>
-                <a:spcPct val="0"/>
-              </a:spcBef>
-              <a:spcAft>
-                <a:spcPct val="0"/>
-              </a:spcAft>
-              <a:buClr>
-                <a:schemeClr val="bg2"/>
-              </a:buClr>
-              <a:buFont typeface="Times" panose="02020603050405020304" pitchFamily="18" charset="0"/>
-              <a:buChar char="•"/>
-              <a:defRPr sz="1200">
-                <a:solidFill>
-                  <a:schemeClr val="tx1"/>
-                </a:solidFill>
-                <a:latin typeface="Tahoma" panose="020B0604030504040204" pitchFamily="34" charset="0"/>
-                <a:ea typeface="ＭＳ Ｐゴシック" panose="020B0600070205080204" pitchFamily="34" charset="-128"/>
-              </a:defRPr>
-            </a:lvl7pPr>
-            <a:lvl8pPr marL="3090863" indent="-190500" eaLnBrk="0" fontAlgn="base" hangingPunct="0">
-              <a:lnSpc>
-                <a:spcPts val="2500"/>
-              </a:lnSpc>
-              <a:spcBef>
-                <a:spcPct val="0"/>
-              </a:spcBef>
-              <a:spcAft>
-                <a:spcPct val="0"/>
-              </a:spcAft>
-              <a:buClr>
-                <a:schemeClr val="bg2"/>
-              </a:buClr>
-              <a:buFont typeface="Times" panose="02020603050405020304" pitchFamily="18" charset="0"/>
-              <a:buChar char="•"/>
-              <a:defRPr sz="1200">
-                <a:solidFill>
-                  <a:schemeClr val="tx1"/>
-                </a:solidFill>
-                <a:latin typeface="Tahoma" panose="020B0604030504040204" pitchFamily="34" charset="0"/>
-                <a:ea typeface="ＭＳ Ｐゴシック" panose="020B0600070205080204" pitchFamily="34" charset="-128"/>
-              </a:defRPr>
-            </a:lvl8pPr>
-            <a:lvl9pPr marL="3548063" indent="-190500" eaLnBrk="0" fontAlgn="base" hangingPunct="0">
-              <a:lnSpc>
-                <a:spcPts val="2500"/>
-              </a:lnSpc>
-              <a:spcBef>
-                <a:spcPct val="0"/>
-              </a:spcBef>
-              <a:spcAft>
-                <a:spcPct val="0"/>
-              </a:spcAft>
-              <a:buClr>
-                <a:schemeClr val="bg2"/>
-              </a:buClr>
-              <a:buFont typeface="Times" panose="02020603050405020304" pitchFamily="18" charset="0"/>
-              <a:buChar char="•"/>
-              <a:defRPr sz="1200">
-                <a:solidFill>
-                  <a:schemeClr val="tx1"/>
-                </a:solidFill>
-                <a:latin typeface="Tahoma" panose="020B0604030504040204" pitchFamily="34" charset="0"/>
-                <a:ea typeface="ＭＳ Ｐゴシック" panose="020B0600070205080204" pitchFamily="34" charset="-128"/>
-              </a:defRPr>
-            </a:lvl9pPr>
-          </a:lstStyle>
-          <a:p>
-            <a:pPr>
-              <a:lnSpc>
-                <a:spcPct val="100000"/>
-              </a:lnSpc>
-              <a:buClrTx/>
-              <a:buFontTx/>
-              <a:buNone/>
-            </a:pPr>
-            <a:endParaRPr lang="nl-NL" altLang="nl-NL" sz="2400">
-              <a:latin typeface="Arial" panose="020B0604020202020204" pitchFamily="34" charset="0"/>
-            </a:endParaRPr>
-          </a:p>
-        </p:txBody>
-      </p:sp>
-      <p:sp>
-        <p:nvSpPr>
-          <p:cNvPr id="17411" name="Title 3"/>
+          <p:cNvPr id="2" name="Titel 1"/>
           <p:cNvSpPr>
             <a:spLocks noGrp="1"/>
           </p:cNvSpPr>
           <p:nvPr>
-            <p:ph type="ctrTitle"/>
+            <p:ph type="title"/>
           </p:nvPr>
         </p:nvSpPr>
-        <p:spPr>
-          <a:xfrm>
-            <a:off x="685800" y="2155825"/>
-            <a:ext cx="6799263" cy="646113"/>
-          </a:xfrm>
-        </p:spPr>
+        <p:spPr/>
         <p:txBody>
           <a:bodyPr/>
           <a:lstStyle/>
           <a:p>
-            <a:pPr marL="0" indent="0">
-              <a:defRPr/>
-            </a:pPr>
-            <a:r>
-              <a:rPr lang="en-US" altLang="nl-NL" dirty="0" smtClean="0">
-                <a:latin typeface="+mn-lt"/>
-              </a:rPr>
-              <a:t>Alarm</a:t>
-            </a:r>
-            <a:endParaRPr lang="en-US" altLang="nl-NL" dirty="0" smtClean="0">
-              <a:latin typeface="+mn-lt"/>
-            </a:endParaRPr>
-          </a:p>
-        </p:txBody>
-      </p:sp>
-      <p:sp>
-        <p:nvSpPr>
-          <p:cNvPr id="3076" name="Subtitle 4"/>
-          <p:cNvSpPr>
-            <a:spLocks noGrp="1"/>
-          </p:cNvSpPr>
-          <p:nvPr>
-            <p:ph type="subTitle" idx="1"/>
-          </p:nvPr>
-        </p:nvSpPr>
-        <p:spPr>
-          <a:xfrm>
-            <a:off x="693738" y="2862263"/>
-            <a:ext cx="6781800" cy="828675"/>
-          </a:xfrm>
-        </p:spPr>
-        <p:txBody>
-          <a:bodyPr/>
-          <a:lstStyle/>
-          <a:p>
-            <a:endParaRPr lang="en-US" altLang="nl-NL" dirty="0" smtClean="0">
-              <a:latin typeface="Tahoma" panose="020B0604030504040204" pitchFamily="34" charset="0"/>
-              <a:ea typeface="ＭＳ Ｐゴシック" panose="020B0600070205080204" pitchFamily="34" charset="-128"/>
-            </a:endParaRPr>
-          </a:p>
-        </p:txBody>
-      </p:sp>
-      <p:sp>
-        <p:nvSpPr>
-          <p:cNvPr id="7" name="Rectangle 20"/>
-          <p:cNvSpPr>
-            <a:spLocks noChangeArrowheads="1"/>
-          </p:cNvSpPr>
-          <p:nvPr/>
-        </p:nvSpPr>
-        <p:spPr bwMode="auto">
-          <a:xfrm>
-            <a:off x="0" y="0"/>
-            <a:ext cx="469900" cy="2057400"/>
-          </a:xfrm>
-          <a:prstGeom prst="rect">
-            <a:avLst/>
-          </a:prstGeom>
-          <a:solidFill>
-            <a:srgbClr val="00A6D6"/>
-          </a:solidFill>
-          <a:ln w="9525">
-            <a:noFill/>
-            <a:miter lim="800000"/>
-            <a:headEnd/>
-            <a:tailEnd/>
-          </a:ln>
-          <a:effectLst/>
-        </p:spPr>
-        <p:txBody>
-          <a:bodyPr wrap="none" anchor="ctr"/>
-          <a:lstStyle/>
-          <a:p>
-            <a:pPr algn="r">
-              <a:defRPr/>
-            </a:pPr>
-            <a:endParaRPr lang="nl-NL" sz="2200">
-              <a:cs typeface="+mn-cs"/>
-            </a:endParaRPr>
+            <a:r>
+              <a:rPr lang="nl-NL" dirty="0" smtClean="0"/>
+              <a:t>Alarm module</a:t>
+            </a:r>
+            <a:endParaRPr lang="nl-NL" dirty="0"/>
           </a:p>
         </p:txBody>
       </p:sp>
     </p:spTree>
+    <p:extLst>
+      <p:ext uri="{BB962C8B-B14F-4D97-AF65-F5344CB8AC3E}">
+        <p14:creationId xmlns:p14="http://schemas.microsoft.com/office/powerpoint/2010/main" val="359377231"/>
+      </p:ext>
+    </p:extLst>
   </p:cSld>
   <p:clrMapOvr>
     <a:masterClrMapping/>
   </p:clrMapOvr>
-  <p:timing>
-    <p:tnLst>
-      <p:par>
-        <p:cTn id="1" dur="indefinite" restart="never" nodeType="tmRoot"/>
-      </p:par>
-    </p:tnLst>
-  </p:timing>
 </p:sld>
 </file>
 
@@ -5297,10 +4986,6 @@
               </a:rPr>
               <a:t>FSM</a:t>
             </a:r>
-            <a:endParaRPr lang="nl-NL" altLang="nl-NL" dirty="0" smtClean="0">
-              <a:latin typeface="+mn-lt"/>
-              <a:ea typeface="ＭＳ Ｐゴシック" pitchFamily="34" charset="-128"/>
-            </a:endParaRPr>
           </a:p>
         </p:txBody>
       </p:sp>

</xml_diff>